<commit_message>
Complete Prototype - Demo updating...
</commit_message>
<xml_diff>
--- a/Báo cáo cuối kỳ/4. Prototype/Slide.pptx
+++ b/Báo cáo cuối kỳ/4. Prototype/Slide.pptx
@@ -17,6 +17,7 @@
     <p:sldId id="269" r:id="rId11"/>
     <p:sldId id="266" r:id="rId12"/>
     <p:sldId id="265" r:id="rId13"/>
+    <p:sldId id="270" r:id="rId14"/>
   </p:sldIdLst>
   <p:sldSz cx="12192000" cy="6858000"/>
   <p:notesSz cx="6858000" cy="9144000"/>
@@ -845,7 +846,7 @@
           <a:p>
             <a:fld id="{A7C4B4EA-4E57-43B5-9E64-45E867927BA5}" type="datetimeFigureOut">
               <a:rPr lang="en-US" smtClean="0"/>
-              <a:t>12/4/2016</a:t>
+              <a:t>07/12/2016</a:t>
             </a:fld>
             <a:endParaRPr lang="en-US"/>
           </a:p>
@@ -1096,7 +1097,7 @@
           <a:p>
             <a:fld id="{A7C4B4EA-4E57-43B5-9E64-45E867927BA5}" type="datetimeFigureOut">
               <a:rPr lang="en-US" smtClean="0"/>
-              <a:t>12/4/2016</a:t>
+              <a:t>07/12/2016</a:t>
             </a:fld>
             <a:endParaRPr lang="en-US"/>
           </a:p>
@@ -1410,7 +1411,7 @@
           <a:p>
             <a:fld id="{A7C4B4EA-4E57-43B5-9E64-45E867927BA5}" type="datetimeFigureOut">
               <a:rPr lang="en-US" smtClean="0"/>
-              <a:t>12/4/2016</a:t>
+              <a:t>07/12/2016</a:t>
             </a:fld>
             <a:endParaRPr lang="en-US"/>
           </a:p>
@@ -1751,7 +1752,7 @@
           <a:p>
             <a:fld id="{A7C4B4EA-4E57-43B5-9E64-45E867927BA5}" type="datetimeFigureOut">
               <a:rPr lang="en-US" smtClean="0"/>
-              <a:t>12/4/2016</a:t>
+              <a:t>07/12/2016</a:t>
             </a:fld>
             <a:endParaRPr lang="en-US"/>
           </a:p>
@@ -2065,7 +2066,7 @@
           <a:p>
             <a:fld id="{A7C4B4EA-4E57-43B5-9E64-45E867927BA5}" type="datetimeFigureOut">
               <a:rPr lang="en-US" smtClean="0"/>
-              <a:t>12/4/2016</a:t>
+              <a:t>07/12/2016</a:t>
             </a:fld>
             <a:endParaRPr lang="en-US"/>
           </a:p>
@@ -2458,7 +2459,7 @@
           <a:p>
             <a:fld id="{A7C4B4EA-4E57-43B5-9E64-45E867927BA5}" type="datetimeFigureOut">
               <a:rPr lang="en-US" smtClean="0"/>
-              <a:t>12/4/2016</a:t>
+              <a:t>07/12/2016</a:t>
             </a:fld>
             <a:endParaRPr lang="en-US"/>
           </a:p>
@@ -2628,7 +2629,7 @@
           <a:p>
             <a:fld id="{A7C4B4EA-4E57-43B5-9E64-45E867927BA5}" type="datetimeFigureOut">
               <a:rPr lang="en-US" smtClean="0"/>
-              <a:t>12/4/2016</a:t>
+              <a:t>07/12/2016</a:t>
             </a:fld>
             <a:endParaRPr lang="en-US"/>
           </a:p>
@@ -2808,7 +2809,7 @@
           <a:p>
             <a:fld id="{A7C4B4EA-4E57-43B5-9E64-45E867927BA5}" type="datetimeFigureOut">
               <a:rPr lang="en-US" smtClean="0"/>
-              <a:t>12/4/2016</a:t>
+              <a:t>07/12/2016</a:t>
             </a:fld>
             <a:endParaRPr lang="en-US"/>
           </a:p>
@@ -2984,7 +2985,7 @@
           <a:p>
             <a:fld id="{A7C4B4EA-4E57-43B5-9E64-45E867927BA5}" type="datetimeFigureOut">
               <a:rPr lang="en-US" smtClean="0"/>
-              <a:t>12/4/2016</a:t>
+              <a:t>07/12/2016</a:t>
             </a:fld>
             <a:endParaRPr lang="en-US"/>
           </a:p>
@@ -3231,7 +3232,7 @@
           <a:p>
             <a:fld id="{A7C4B4EA-4E57-43B5-9E64-45E867927BA5}" type="datetimeFigureOut">
               <a:rPr lang="en-US" smtClean="0"/>
-              <a:t>12/4/2016</a:t>
+              <a:t>07/12/2016</a:t>
             </a:fld>
             <a:endParaRPr lang="en-US"/>
           </a:p>
@@ -3463,7 +3464,7 @@
           <a:p>
             <a:fld id="{A7C4B4EA-4E57-43B5-9E64-45E867927BA5}" type="datetimeFigureOut">
               <a:rPr lang="en-US" smtClean="0"/>
-              <a:t>12/4/2016</a:t>
+              <a:t>07/12/2016</a:t>
             </a:fld>
             <a:endParaRPr lang="en-US"/>
           </a:p>
@@ -3837,7 +3838,7 @@
           <a:p>
             <a:fld id="{A7C4B4EA-4E57-43B5-9E64-45E867927BA5}" type="datetimeFigureOut">
               <a:rPr lang="en-US" smtClean="0"/>
-              <a:t>12/4/2016</a:t>
+              <a:t>07/12/2016</a:t>
             </a:fld>
             <a:endParaRPr lang="en-US"/>
           </a:p>
@@ -3960,7 +3961,7 @@
           <a:p>
             <a:fld id="{A7C4B4EA-4E57-43B5-9E64-45E867927BA5}" type="datetimeFigureOut">
               <a:rPr lang="en-US" smtClean="0"/>
-              <a:t>12/4/2016</a:t>
+              <a:t>07/12/2016</a:t>
             </a:fld>
             <a:endParaRPr lang="en-US"/>
           </a:p>
@@ -4055,7 +4056,7 @@
           <a:p>
             <a:fld id="{A7C4B4EA-4E57-43B5-9E64-45E867927BA5}" type="datetimeFigureOut">
               <a:rPr lang="en-US" smtClean="0"/>
-              <a:t>12/4/2016</a:t>
+              <a:t>07/12/2016</a:t>
             </a:fld>
             <a:endParaRPr lang="en-US"/>
           </a:p>
@@ -4310,7 +4311,7 @@
           <a:p>
             <a:fld id="{A7C4B4EA-4E57-43B5-9E64-45E867927BA5}" type="datetimeFigureOut">
               <a:rPr lang="en-US" smtClean="0"/>
-              <a:t>12/4/2016</a:t>
+              <a:t>07/12/2016</a:t>
             </a:fld>
             <a:endParaRPr lang="en-US"/>
           </a:p>
@@ -4573,7 +4574,7 @@
           <a:p>
             <a:fld id="{A7C4B4EA-4E57-43B5-9E64-45E867927BA5}" type="datetimeFigureOut">
               <a:rPr lang="en-US" smtClean="0"/>
-              <a:t>12/4/2016</a:t>
+              <a:t>07/12/2016</a:t>
             </a:fld>
             <a:endParaRPr lang="en-US"/>
           </a:p>
@@ -5316,7 +5317,7 @@
           <a:p>
             <a:fld id="{A7C4B4EA-4E57-43B5-9E64-45E867927BA5}" type="datetimeFigureOut">
               <a:rPr lang="en-US" smtClean="0"/>
-              <a:t>12/4/2016</a:t>
+              <a:t>07/12/2016</a:t>
             </a:fld>
             <a:endParaRPr lang="en-US"/>
           </a:p>
@@ -5875,33 +5876,40 @@
         <p:spPr/>
         <p:txBody>
           <a:bodyPr>
-            <a:normAutofit fontScale="25000" lnSpcReduction="20000"/>
+            <a:noAutofit/>
           </a:bodyPr>
           <a:lstStyle/>
           <a:p>
             <a:r>
-              <a:rPr lang="en-US" sz="7200"/>
+              <a:rPr lang="en-US" sz="2000" dirty="0">
+                <a:latin typeface="Candara" panose="020E0502030303020204" pitchFamily="34" charset="0"/>
+              </a:rPr>
               <a:t>Nhóm 28:</a:t>
             </a:r>
           </a:p>
           <a:p>
             <a:r>
-              <a:rPr lang="en-US" sz="7200"/>
+              <a:rPr lang="en-US" sz="2000" dirty="0">
+                <a:latin typeface="Candara" panose="020E0502030303020204" pitchFamily="34" charset="0"/>
+              </a:rPr>
               <a:t>	Văn Vũ Tuấn</a:t>
             </a:r>
           </a:p>
           <a:p>
             <a:r>
-              <a:rPr lang="en-US" sz="7200"/>
+              <a:rPr lang="en-US" sz="2000" dirty="0">
+                <a:latin typeface="Candara" panose="020E0502030303020204" pitchFamily="34" charset="0"/>
+              </a:rPr>
               <a:t>Phạm Ngọc Linh</a:t>
             </a:r>
           </a:p>
           <a:p>
             <a:r>
-              <a:rPr lang="en-US" sz="7200"/>
+              <a:rPr lang="en-US" sz="2000" dirty="0">
+                <a:latin typeface="Candara" panose="020E0502030303020204" pitchFamily="34" charset="0"/>
+              </a:rPr>
               <a:t>Huỳnh Đức Đăng Khoa</a:t>
             </a:r>
-            <a:endParaRPr lang="en-US"/>
           </a:p>
         </p:txBody>
       </p:sp>
@@ -5969,10 +5977,103 @@
         </p:nvSpPr>
         <p:spPr/>
         <p:txBody>
-          <a:bodyPr/>
-          <a:lstStyle/>
-          <a:p>
-            <a:endParaRPr lang="en-US" b="1"/>
+          <a:bodyPr>
+            <a:normAutofit/>
+          </a:bodyPr>
+          <a:lstStyle/>
+          <a:p>
+            <a:r>
+              <a:rPr lang="vi-VN" sz="2000" dirty="0">
+                <a:latin typeface="Candara" panose="020E0502030303020204" pitchFamily="34" charset="0"/>
+              </a:rPr>
+              <a:t>Abstract Factory và Protoype có thể được sử dụng cùng </a:t>
+            </a:r>
+            <a:r>
+              <a:rPr lang="vi-VN" sz="2000" dirty="0" smtClean="0">
+                <a:latin typeface="Candara" panose="020E0502030303020204" pitchFamily="34" charset="0"/>
+              </a:rPr>
+              <a:t>nhau</a:t>
+            </a:r>
+            <a:endParaRPr lang="vi-VN" sz="2000" dirty="0">
+              <a:latin typeface="Candara" panose="020E0502030303020204" pitchFamily="34" charset="0"/>
+            </a:endParaRPr>
+          </a:p>
+          <a:p>
+            <a:pPr lvl="1"/>
+            <a:r>
+              <a:rPr lang="vi-VN" sz="1800" dirty="0">
+                <a:latin typeface="Candara" panose="020E0502030303020204" pitchFamily="34" charset="0"/>
+              </a:rPr>
+              <a:t>Abstract Factory có thể lưu trữ tập các nguyên mẫu được nhân bản để trở về </a:t>
+            </a:r>
+            <a:r>
+              <a:rPr lang="vi-VN" sz="1800" dirty="0" smtClean="0">
+                <a:latin typeface="Candara" panose="020E0502030303020204" pitchFamily="34" charset="0"/>
+              </a:rPr>
+              <a:t>đối</a:t>
+            </a:r>
+            <a:r>
+              <a:rPr lang="en-US" sz="1800" dirty="0" smtClean="0">
+                <a:latin typeface="Candara" panose="020E0502030303020204" pitchFamily="34" charset="0"/>
+              </a:rPr>
+              <a:t> </a:t>
+            </a:r>
+            <a:r>
+              <a:rPr lang="vi-VN" sz="1800" dirty="0" smtClean="0">
+                <a:latin typeface="Candara" panose="020E0502030303020204" pitchFamily="34" charset="0"/>
+              </a:rPr>
+              <a:t>tượng </a:t>
+            </a:r>
+            <a:r>
+              <a:rPr lang="vi-VN" sz="1800" dirty="0">
+                <a:latin typeface="Candara" panose="020E0502030303020204" pitchFamily="34" charset="0"/>
+              </a:rPr>
+              <a:t>sản </a:t>
+            </a:r>
+            <a:r>
+              <a:rPr lang="vi-VN" sz="1800" dirty="0" smtClean="0">
+                <a:latin typeface="Candara" panose="020E0502030303020204" pitchFamily="34" charset="0"/>
+              </a:rPr>
+              <a:t>phẩm</a:t>
+            </a:r>
+            <a:endParaRPr lang="vi-VN" sz="1800" dirty="0">
+              <a:latin typeface="Candara" panose="020E0502030303020204" pitchFamily="34" charset="0"/>
+            </a:endParaRPr>
+          </a:p>
+          <a:p>
+            <a:r>
+              <a:rPr lang="vi-VN" sz="2000" dirty="0">
+                <a:latin typeface="Candara" panose="020E0502030303020204" pitchFamily="34" charset="0"/>
+              </a:rPr>
+              <a:t>Khi Composite và Decorator được sử dụng với nhau, thì Prototype cũng có </a:t>
+            </a:r>
+            <a:r>
+              <a:rPr lang="vi-VN" sz="2000" dirty="0" smtClean="0">
+                <a:latin typeface="Candara" panose="020E0502030303020204" pitchFamily="34" charset="0"/>
+              </a:rPr>
+              <a:t>thể</a:t>
+            </a:r>
+            <a:r>
+              <a:rPr lang="en-US" sz="2000" dirty="0" smtClean="0">
+                <a:latin typeface="Candara" panose="020E0502030303020204" pitchFamily="34" charset="0"/>
+              </a:rPr>
+              <a:t> </a:t>
+            </a:r>
+            <a:r>
+              <a:rPr lang="vi-VN" sz="2000" dirty="0" smtClean="0">
+                <a:latin typeface="Candara" panose="020E0502030303020204" pitchFamily="34" charset="0"/>
+              </a:rPr>
+              <a:t>được </a:t>
+            </a:r>
+            <a:r>
+              <a:rPr lang="vi-VN" sz="2000" dirty="0">
+                <a:latin typeface="Candara" panose="020E0502030303020204" pitchFamily="34" charset="0"/>
+              </a:rPr>
+              <a:t>sử dụng</a:t>
+            </a:r>
+            <a:endParaRPr lang="en-US" sz="2000" dirty="0">
+              <a:latin typeface="Candara" panose="020E0502030303020204" pitchFamily="34" charset="0"/>
+            </a:endParaRPr>
           </a:p>
         </p:txBody>
       </p:sp>
@@ -6040,25 +6141,44 @@
         </p:nvSpPr>
         <p:spPr/>
         <p:txBody>
-          <a:bodyPr/>
+          <a:bodyPr>
+            <a:normAutofit/>
+          </a:bodyPr>
           <a:lstStyle/>
           <a:p>
             <a:pPr lvl="0" fontAlgn="base"/>
             <a:r>
-              <a:rPr lang="en-US"/>
-              <a:t>Trong C#, giao diện IClonable cho phép các lớp nào hiện thực nó khả năng tự sao chép bản thân theo kiểu deep copy hoặc theo kiểu shallow copy.</a:t>
-            </a:r>
-          </a:p>
-          <a:p>
-            <a:r>
-              <a:rPr lang="en-US"/>
-              <a:t>Hàm MemberwiseClone() của lớp Object trong C# cũng có chức năng </a:t>
-            </a:r>
-            <a:r>
-              <a:rPr lang="en-US"/>
-              <a:t>tương tự.</a:t>
-            </a:r>
-            <a:endParaRPr lang="en-US"/>
+              <a:rPr lang="en-US" sz="2000" dirty="0">
+                <a:latin typeface="Candara" panose="020E0502030303020204" pitchFamily="34" charset="0"/>
+              </a:rPr>
+              <a:t>Trong C#, giao diện IClonable cho phép các lớp nào hiện thực nó khả năng tự sao chép bản thân theo kiểu deep copy hoặc theo kiểu shallow copy</a:t>
+            </a:r>
+            <a:r>
+              <a:rPr lang="en-US" sz="2000" dirty="0" smtClean="0">
+                <a:latin typeface="Candara" panose="020E0502030303020204" pitchFamily="34" charset="0"/>
+              </a:rPr>
+              <a:t>.</a:t>
+            </a:r>
+          </a:p>
+          <a:p>
+            <a:pPr lvl="0" fontAlgn="base"/>
+            <a:r>
+              <a:rPr lang="vi-VN" sz="2000" dirty="0">
+                <a:latin typeface="Candara" panose="020E0502030303020204" pitchFamily="34" charset="0"/>
+              </a:rPr>
+              <a:t>Việc thực thi mẫu Prototype trong C# được hỗ trợ rất nhiều bởi hai cơ sở trong .NET Framework: cloning và serialization</a:t>
+            </a:r>
+            <a:endParaRPr lang="en-US" sz="2000" dirty="0">
+              <a:latin typeface="Candara" panose="020E0502030303020204" pitchFamily="34" charset="0"/>
+            </a:endParaRPr>
+          </a:p>
+          <a:p>
+            <a:r>
+              <a:rPr lang="en-US" sz="2000" dirty="0">
+                <a:latin typeface="Candara" panose="020E0502030303020204" pitchFamily="34" charset="0"/>
+              </a:rPr>
+              <a:t>Hàm MemberwiseClone() của lớp Object trong C# cũng có chức năng tương tự.</a:t>
+            </a:r>
           </a:p>
         </p:txBody>
       </p:sp>
@@ -6108,7 +6228,7 @@
           <a:lstStyle/>
           <a:p>
             <a:r>
-              <a:rPr lang="en-US" b="1"/>
+              <a:rPr lang="en-US" b="1" dirty="0"/>
               <a:t>Demo</a:t>
             </a:r>
           </a:p>
@@ -6126,10 +6246,17 @@
         </p:nvSpPr>
         <p:spPr/>
         <p:txBody>
-          <a:bodyPr/>
-          <a:lstStyle/>
-          <a:p>
-            <a:endParaRPr lang="en-US"/>
+          <a:bodyPr>
+            <a:normAutofit/>
+          </a:bodyPr>
+          <a:lstStyle/>
+          <a:p>
+            <a:r>
+              <a:rPr lang="en-US" sz="2000" dirty="0" smtClean="0">
+                <a:latin typeface="Candara" panose="020E0502030303020204" pitchFamily="34" charset="0"/>
+              </a:rPr>
+              <a:t>Bài toán: Ta muốn mở rộng một framework mã nguồn mở nào đó để phục vụ mục đích cá nhân hoặc tổ chức. Ví dụ tao kế thừa và phát triển Bootstrap framework. Việc mở rộng framework không làm thay đổi bất kỳ thứ gì đến mã nguồn gốc.</a:t>
+            </a:r>
           </a:p>
         </p:txBody>
       </p:sp>
@@ -6137,6 +6264,115 @@
     <p:extLst>
       <p:ext uri="{BB962C8B-B14F-4D97-AF65-F5344CB8AC3E}">
         <p14:creationId xmlns:p14="http://schemas.microsoft.com/office/powerpoint/2010/main" val="3073607429"/>
+      </p:ext>
+    </p:extLst>
+  </p:cSld>
+  <p:clrMapOvr>
+    <a:masterClrMapping/>
+  </p:clrMapOvr>
+</p:sld>
+</file>
+
+<file path=ppt/slides/slide13.xml><?xml version="1.0" encoding="utf-8"?>
+<p:sld xmlns:a="http://schemas.openxmlformats.org/drawingml/2006/main" xmlns:r="http://schemas.openxmlformats.org/officeDocument/2006/relationships" xmlns:p="http://schemas.openxmlformats.org/presentationml/2006/main">
+  <p:cSld>
+    <p:spTree>
+      <p:nvGrpSpPr>
+        <p:cNvPr id="1" name=""/>
+        <p:cNvGrpSpPr/>
+        <p:nvPr/>
+      </p:nvGrpSpPr>
+      <p:grpSpPr>
+        <a:xfrm>
+          <a:off x="0" y="0"/>
+          <a:ext cx="0" cy="0"/>
+          <a:chOff x="0" y="0"/>
+          <a:chExt cx="0" cy="0"/>
+        </a:xfrm>
+      </p:grpSpPr>
+      <p:sp>
+        <p:nvSpPr>
+          <p:cNvPr id="2" name="Title 1"/>
+          <p:cNvSpPr>
+            <a:spLocks noGrp="1"/>
+          </p:cNvSpPr>
+          <p:nvPr>
+            <p:ph type="title"/>
+          </p:nvPr>
+        </p:nvSpPr>
+        <p:spPr/>
+        <p:txBody>
+          <a:bodyPr/>
+          <a:lstStyle/>
+          <a:p>
+            <a:r>
+              <a:rPr lang="en-US" b="1" dirty="0" smtClean="0"/>
+              <a:t>Sơ đồ bài toán</a:t>
+            </a:r>
+            <a:endParaRPr lang="en-US" b="1" dirty="0"/>
+          </a:p>
+        </p:txBody>
+      </p:sp>
+      <p:sp>
+        <p:nvSpPr>
+          <p:cNvPr id="3" name="Content Placeholder 2"/>
+          <p:cNvSpPr>
+            <a:spLocks noGrp="1"/>
+          </p:cNvSpPr>
+          <p:nvPr>
+            <p:ph idx="1"/>
+          </p:nvPr>
+        </p:nvSpPr>
+        <p:spPr/>
+        <p:txBody>
+          <a:bodyPr>
+            <a:normAutofit/>
+          </a:bodyPr>
+          <a:lstStyle/>
+          <a:p>
+            <a:endParaRPr lang="en-US" sz="2000" dirty="0" smtClean="0">
+              <a:latin typeface="Candara" panose="020E0502030303020204" pitchFamily="34" charset="0"/>
+            </a:endParaRPr>
+          </a:p>
+        </p:txBody>
+      </p:sp>
+      <p:pic>
+        <p:nvPicPr>
+          <p:cNvPr id="4" name="Picture 3" descr="https://lh6.googleusercontent.com/Fk56jwz6z3eagIuCWLAwpH14Oq7x2s7-jlkXD16ZN0NIrEj-opKmPROzeg2qxGrz_eLs3e9EpdSdu5HtD7dbgv1_JQm8s-RBTnUnXNDZWSdT9j_CRP4fyWqgHc0Ro-trMv9mKEVa"/>
+          <p:cNvPicPr/>
+          <p:nvPr/>
+        </p:nvPicPr>
+        <p:blipFill>
+          <a:blip r:embed="rId2">
+            <a:extLst>
+              <a:ext uri="{28A0092B-C50C-407E-A947-70E740481C1C}">
+                <a14:useLocalDpi xmlns:a14="http://schemas.microsoft.com/office/drawing/2010/main" val="0"/>
+              </a:ext>
+            </a:extLst>
+          </a:blip>
+          <a:srcRect/>
+          <a:stretch>
+            <a:fillRect/>
+          </a:stretch>
+        </p:blipFill>
+        <p:spPr bwMode="auto">
+          <a:xfrm>
+            <a:off x="1341412" y="2510620"/>
+            <a:ext cx="6342277" cy="3530742"/>
+          </a:xfrm>
+          <a:prstGeom prst="rect">
+            <a:avLst/>
+          </a:prstGeom>
+          <a:noFill/>
+          <a:ln>
+            <a:noFill/>
+          </a:ln>
+        </p:spPr>
+      </p:pic>
+    </p:spTree>
+    <p:extLst>
+      <p:ext uri="{BB962C8B-B14F-4D97-AF65-F5344CB8AC3E}">
+        <p14:creationId xmlns:p14="http://schemas.microsoft.com/office/powerpoint/2010/main" val="1486558705"/>
       </p:ext>
     </p:extLst>
   </p:cSld>
@@ -6197,28 +6433,40 @@
         </p:nvSpPr>
         <p:spPr/>
         <p:txBody>
-          <a:bodyPr/>
-          <a:lstStyle/>
-          <a:p>
-            <a:r>
-              <a:rPr lang="en-US"/>
+          <a:bodyPr>
+            <a:normAutofit/>
+          </a:bodyPr>
+          <a:lstStyle/>
+          <a:p>
+            <a:r>
+              <a:rPr lang="en-US" sz="2000" dirty="0">
+                <a:latin typeface="Candara" panose="020E0502030303020204" pitchFamily="34" charset="0"/>
+              </a:rPr>
               <a:t>Tên đầy đủ: Prototype Pattern</a:t>
             </a:r>
-            <a:endParaRPr lang="en-US" b="1"/>
-          </a:p>
-          <a:p>
-            <a:r>
-              <a:rPr lang="en-US"/>
+            <a:endParaRPr lang="en-US" sz="2000" b="1" dirty="0">
+              <a:latin typeface="Candara" panose="020E0502030303020204" pitchFamily="34" charset="0"/>
+            </a:endParaRPr>
+          </a:p>
+          <a:p>
+            <a:r>
+              <a:rPr lang="en-US" sz="2000" dirty="0">
+                <a:latin typeface="Candara" panose="020E0502030303020204" pitchFamily="34" charset="0"/>
+              </a:rPr>
               <a:t>Tên ngắn gọn</a:t>
             </a:r>
             <a:r>
-              <a:rPr lang="en-US" b="1"/>
+              <a:rPr lang="en-US" sz="2000" b="1" dirty="0">
+                <a:latin typeface="Candara" panose="020E0502030303020204" pitchFamily="34" charset="0"/>
+              </a:rPr>
               <a:t>: Prototype</a:t>
             </a:r>
           </a:p>
           <a:p>
             <a:r>
-              <a:rPr lang="en-US"/>
+              <a:rPr lang="en-US" sz="2000" dirty="0">
+                <a:latin typeface="Candara" panose="020E0502030303020204" pitchFamily="34" charset="0"/>
+              </a:rPr>
               <a:t>Phân loại: Creational.</a:t>
             </a:r>
           </a:p>
@@ -6288,16 +6536,22 @@
         </p:nvSpPr>
         <p:spPr/>
         <p:txBody>
-          <a:bodyPr/>
-          <a:lstStyle/>
-          <a:p>
-            <a:r>
-              <a:rPr lang="en-US"/>
+          <a:bodyPr>
+            <a:normAutofit/>
+          </a:bodyPr>
+          <a:lstStyle/>
+          <a:p>
+            <a:r>
+              <a:rPr lang="en-US" sz="2000" dirty="0">
+                <a:latin typeface="Candara" panose="020E0502030303020204" pitchFamily="34" charset="0"/>
+              </a:rPr>
               <a:t>Xác định kiểu của đối tượng sẽ được tạo ra bằng một đối tượng nguyên mẫu – prototype, và tạo ra các đối tượng mới bằng cách sao chép nguyên mẫu này.</a:t>
             </a:r>
           </a:p>
           <a:p>
-            <a:endParaRPr lang="en-US"/>
+            <a:endParaRPr lang="en-US" sz="2000" dirty="0">
+              <a:latin typeface="Candara" panose="020E0502030303020204" pitchFamily="34" charset="0"/>
+            </a:endParaRPr>
           </a:p>
         </p:txBody>
       </p:sp>
@@ -6365,46 +6619,60 @@
         </p:nvSpPr>
         <p:spPr/>
         <p:txBody>
-          <a:bodyPr/>
+          <a:bodyPr>
+            <a:normAutofit/>
+          </a:bodyPr>
           <a:lstStyle/>
           <a:p>
             <a:pPr lvl="0"/>
             <a:r>
-              <a:rPr lang="en-US"/>
+              <a:rPr lang="en-US" sz="2000" dirty="0">
+                <a:latin typeface="Candara" panose="020E0502030303020204" pitchFamily="34" charset="0"/>
+              </a:rPr>
               <a:t>Khi chương trình của chúng ta cần sử dụng một lớp tổng quát và chúng ta không cần biết lớp cụ thể nào sẽ được sử dụng cho đến khi chương trình được thực thi.</a:t>
             </a:r>
           </a:p>
           <a:p>
             <a:pPr lvl="0" fontAlgn="base"/>
             <a:r>
-              <a:rPr lang="en-US"/>
-              <a:t>Khi một việc tạo một đối tượng mới tốn quá nhiều chi phí (bộ nhớ, thời gian). Ta tạo ra một đối tượng mới bằng cách sao chép từ prototype tương ứng.</a:t>
-            </a:r>
+              <a:rPr lang="en-US" sz="2000" dirty="0">
+                <a:latin typeface="Candara" panose="020E0502030303020204" pitchFamily="34" charset="0"/>
+              </a:rPr>
+              <a:t>Khi một việc tạo một đối tượng mới tốn quá nhiều chi phí (bộ nhớ, thời gian). Ta tạo ra một đối tượng mới bằng cách sao chép từ prototype tương ứng</a:t>
+            </a:r>
+            <a:r>
+              <a:rPr lang="en-US" sz="2000" dirty="0" smtClean="0">
+                <a:latin typeface="Candara" panose="020E0502030303020204" pitchFamily="34" charset="0"/>
+              </a:rPr>
+              <a:t>.</a:t>
+            </a:r>
+            <a:endParaRPr lang="en-US" sz="2000" dirty="0">
+              <a:latin typeface="Candara" panose="020E0502030303020204" pitchFamily="34" charset="0"/>
+            </a:endParaRPr>
           </a:p>
           <a:p>
             <a:pPr lvl="0" fontAlgn="base"/>
             <a:r>
-              <a:rPr lang="en-US"/>
-              <a:t>Khi hệ thống cần độc lập với các sản phẩm mà nó tạo ra, kết hợp và thể hiện chúng.</a:t>
+              <a:rPr lang="en-US" sz="2000" dirty="0">
+                <a:latin typeface="Candara" panose="020E0502030303020204" pitchFamily="34" charset="0"/>
+              </a:rPr>
+              <a:t>Khi ta muốn tránh việc tạo ra cây phân cấp các Factory.</a:t>
             </a:r>
           </a:p>
           <a:p>
             <a:pPr lvl="0" fontAlgn="base"/>
             <a:r>
-              <a:rPr lang="en-US"/>
-              <a:t>Khi ta muốn tránh việc tạo ra cây phân cấp các Factory.</a:t>
+              <a:rPr lang="en-US" sz="2000" dirty="0">
+                <a:latin typeface="Candara" panose="020E0502030303020204" pitchFamily="34" charset="0"/>
+              </a:rPr>
+              <a:t>Khi việc sao chép một đối tượng dễ dàng thực hiện hơn là tạo ra một đối tượng mới.</a:t>
             </a:r>
           </a:p>
           <a:p>
             <a:pPr lvl="0" fontAlgn="base"/>
-            <a:r>
-              <a:rPr lang="en-US"/>
-              <a:t>Khi việc sao chép một đối tượng dễ dàng thực hiện hơn là tạo ra một đối tượng mới.</a:t>
-            </a:r>
-          </a:p>
-          <a:p>
-            <a:pPr lvl="0" fontAlgn="base"/>
-            <a:endParaRPr lang="en-US"/>
+            <a:endParaRPr lang="en-US" sz="2000" dirty="0">
+              <a:latin typeface="Candara" panose="020E0502030303020204" pitchFamily="34" charset="0"/>
+            </a:endParaRPr>
           </a:p>
         </p:txBody>
       </p:sp>
@@ -6478,7 +6746,33 @@
           <a:lstStyle/>
           <a:p>
             <a:pPr lvl="1"/>
-            <a:endParaRPr lang="en-US"/>
+            <a:r>
+              <a:rPr lang="vi-VN" sz="2000" dirty="0">
+                <a:latin typeface="Candara" panose="020E0502030303020204" pitchFamily="34" charset="0"/>
+              </a:rPr>
+              <a:t>Mẫu Prototype có hai lợi thế: nó tăng tốc độ khởi tạo của đối tượng rất lớn, các lớp được nạp động (khi sao chép các đối tượng nhanh hơn), và nó giữ một bản ghi của các bộ phận mang tính chất của một cấu trúc dữ liệu lớn có thể được sao chép mà không cần biết lớp con mà từ đó các đối tượng được tạo </a:t>
+            </a:r>
+            <a:r>
+              <a:rPr lang="vi-VN" sz="2000" dirty="0" smtClean="0">
+                <a:latin typeface="Candara" panose="020E0502030303020204" pitchFamily="34" charset="0"/>
+              </a:rPr>
+              <a:t>ra</a:t>
+            </a:r>
+            <a:endParaRPr lang="en-US" sz="2000" dirty="0" smtClean="0">
+              <a:latin typeface="Candara" panose="020E0502030303020204" pitchFamily="34" charset="0"/>
+            </a:endParaRPr>
+          </a:p>
+          <a:p>
+            <a:pPr lvl="1"/>
+            <a:r>
+              <a:rPr lang="en-US" sz="2000" dirty="0" smtClean="0">
+                <a:latin typeface="Candara" panose="020E0502030303020204" pitchFamily="34" charset="0"/>
+              </a:rPr>
+              <a:t>Mẫu prototype được ứng dụng rất nhiều trong tất cả các framework cung cấp cho lập trình viên</a:t>
+            </a:r>
+            <a:endParaRPr lang="en-US" sz="2000" dirty="0">
+              <a:latin typeface="Candara" panose="020E0502030303020204" pitchFamily="34" charset="0"/>
+            </a:endParaRPr>
           </a:p>
         </p:txBody>
       </p:sp>
@@ -6553,46 +6847,64 @@
           <a:p>
             <a:pPr lvl="0" fontAlgn="base"/>
             <a:r>
-              <a:rPr lang="en-US" b="1"/>
+              <a:rPr lang="en-US" sz="2000" b="1" dirty="0">
+                <a:latin typeface="Candara" panose="020E0502030303020204" pitchFamily="34" charset="0"/>
+              </a:rPr>
               <a:t>Prototype</a:t>
             </a:r>
             <a:r>
-              <a:rPr lang="en-US"/>
+              <a:rPr lang="en-US" sz="2000" dirty="0">
+                <a:latin typeface="Candara" panose="020E0502030303020204" pitchFamily="34" charset="0"/>
+              </a:rPr>
               <a:t>: Là một giao diện với một hàm Clone() để các lớp hiện thực nó định nghĩa việc sao chép các đối tượng thuộc lớp đó.</a:t>
             </a:r>
           </a:p>
           <a:p>
             <a:pPr lvl="0" fontAlgn="base"/>
             <a:r>
-              <a:rPr lang="en-US" b="1"/>
+              <a:rPr lang="en-US" sz="2000" b="1" dirty="0">
+                <a:latin typeface="Candara" panose="020E0502030303020204" pitchFamily="34" charset="0"/>
+              </a:rPr>
               <a:t>ConcretePrototype</a:t>
             </a:r>
             <a:r>
-              <a:rPr lang="en-US"/>
+              <a:rPr lang="en-US" sz="2000" dirty="0">
+                <a:latin typeface="Candara" panose="020E0502030303020204" pitchFamily="34" charset="0"/>
+              </a:rPr>
               <a:t>: Các lớp hiện thực giao diện </a:t>
             </a:r>
             <a:r>
-              <a:rPr lang="en-US" b="1"/>
+              <a:rPr lang="en-US" sz="2000" b="1" dirty="0">
+                <a:latin typeface="Candara" panose="020E0502030303020204" pitchFamily="34" charset="0"/>
+              </a:rPr>
               <a:t>Prototype</a:t>
             </a:r>
             <a:r>
-              <a:rPr lang="en-US"/>
+              <a:rPr lang="en-US" sz="2000" dirty="0">
+                <a:latin typeface="Candara" panose="020E0502030303020204" pitchFamily="34" charset="0"/>
+              </a:rPr>
               <a:t> để thực hiện việc sao chép các đối tượng được tạo ra từ chúng.</a:t>
             </a:r>
           </a:p>
           <a:p>
             <a:pPr lvl="0" fontAlgn="base"/>
             <a:r>
-              <a:rPr lang="en-US" b="1"/>
+              <a:rPr lang="en-US" sz="2000" b="1" dirty="0">
+                <a:latin typeface="Candara" panose="020E0502030303020204" pitchFamily="34" charset="0"/>
+              </a:rPr>
               <a:t>Client</a:t>
             </a:r>
             <a:r>
-              <a:rPr lang="en-US"/>
+              <a:rPr lang="en-US" sz="2000" dirty="0">
+                <a:latin typeface="Candara" panose="020E0502030303020204" pitchFamily="34" charset="0"/>
+              </a:rPr>
               <a:t> – nơi sử dụng giao diện Prototype.</a:t>
             </a:r>
           </a:p>
           <a:p>
-            <a:endParaRPr lang="en-US"/>
+            <a:endParaRPr lang="en-US" sz="2000" dirty="0">
+              <a:latin typeface="Candara" panose="020E0502030303020204" pitchFamily="34" charset="0"/>
+            </a:endParaRPr>
           </a:p>
         </p:txBody>
       </p:sp>
@@ -6614,7 +6926,9 @@
           <a:lstStyle/>
           <a:p>
             <a:r>
-              <a:rPr lang="en-US"/>
+              <a:rPr lang="en-US" sz="2000" dirty="0">
+                <a:latin typeface="Candara" panose="020E0502030303020204" pitchFamily="34" charset="0"/>
+              </a:rPr>
               <a:t>Sơ đồ UML</a:t>
             </a:r>
           </a:p>
@@ -6717,63 +7031,41 @@
         </p:nvSpPr>
         <p:spPr/>
         <p:txBody>
-          <a:bodyPr/>
+          <a:bodyPr>
+            <a:normAutofit/>
+          </a:bodyPr>
           <a:lstStyle/>
           <a:p>
             <a:pPr lvl="0" fontAlgn="base"/>
             <a:r>
-              <a:rPr lang="en-US"/>
+              <a:rPr lang="en-US" sz="2000" dirty="0">
+                <a:latin typeface="Candara" panose="020E0502030303020204" pitchFamily="34" charset="0"/>
+              </a:rPr>
               <a:t>Quá trình sao chép bắt đầu với việc khởi tạo một lớp.</a:t>
             </a:r>
           </a:p>
           <a:p>
             <a:pPr lvl="0" fontAlgn="base"/>
             <a:r>
-              <a:rPr lang="en-US"/>
-              <a:t>Client yêu cầu một đối tượng mới </a:t>
-            </a:r>
-            <a:r>
-              <a:rPr lang="en-US"/>
-              <a:t>của một lớp </a:t>
-            </a:r>
-            <a:r>
-              <a:rPr lang="en-US"/>
-              <a:t>nào đó và gửi yêu cầu đến lớp Prototype.</a:t>
+              <a:rPr lang="en-US" sz="2000" dirty="0">
+                <a:latin typeface="Candara" panose="020E0502030303020204" pitchFamily="34" charset="0"/>
+              </a:rPr>
+              <a:t>Client yêu cầu một đối tượng mới của một lớp nào đó và gửi yêu cầu đến lớp Prototype.</a:t>
             </a:r>
           </a:p>
           <a:p>
             <a:pPr lvl="0" fontAlgn="base"/>
             <a:r>
-              <a:rPr lang="en-US"/>
-              <a:t>Một ConcretePrototype, tùy thuộc </a:t>
-            </a:r>
-            <a:r>
-              <a:rPr lang="en-US"/>
-              <a:t>vào lớp mà </a:t>
-            </a:r>
-            <a:r>
-              <a:rPr lang="en-US"/>
-              <a:t>Client cần, sẽ đảm nhận việc </a:t>
-            </a:r>
-            <a:r>
-              <a:rPr lang="en-US"/>
-              <a:t>sao chép bằng </a:t>
-            </a:r>
-            <a:r>
-              <a:rPr lang="en-US"/>
-              <a:t>phương thức clone() mà nó hiện thực khi thực thi giao diện Prototype. Khi đó, một đối tượng </a:t>
-            </a:r>
-            <a:r>
-              <a:rPr lang="en-US"/>
-              <a:t>mới mà </a:t>
-            </a:r>
-            <a:r>
-              <a:rPr lang="en-US"/>
-              <a:t>Client cần sẽ được tạo ra.</a:t>
-            </a:r>
-          </a:p>
-          <a:p>
-            <a:endParaRPr lang="en-US"/>
+              <a:rPr lang="en-US" sz="2000" dirty="0">
+                <a:latin typeface="Candara" panose="020E0502030303020204" pitchFamily="34" charset="0"/>
+              </a:rPr>
+              <a:t>Một ConcretePrototype, tùy thuộc vào lớp mà Client cần, sẽ đảm nhận việc sao chép bằng phương thức clone() mà nó hiện thực khi thực thi giao diện Prototype. Khi đó, một đối tượng mới mà Client cần sẽ được tạo ra.</a:t>
+            </a:r>
+          </a:p>
+          <a:p>
+            <a:endParaRPr lang="en-US" sz="2000" dirty="0">
+              <a:latin typeface="Candara" panose="020E0502030303020204" pitchFamily="34" charset="0"/>
+            </a:endParaRPr>
           </a:p>
         </p:txBody>
       </p:sp>
@@ -6823,7 +7115,9 @@
           <a:lstStyle/>
           <a:p>
             <a:r>
-              <a:rPr lang="en-US" b="1"/>
+              <a:rPr lang="en-US" b="1" dirty="0">
+                <a:latin typeface="Candara" panose="020E0502030303020204" pitchFamily="34" charset="0"/>
+              </a:rPr>
               <a:t>Các hệ quả mang lại</a:t>
             </a:r>
           </a:p>
@@ -6841,16 +7135,22 @@
         </p:nvSpPr>
         <p:spPr/>
         <p:txBody>
-          <a:bodyPr/>
-          <a:lstStyle/>
-          <a:p>
-            <a:r>
-              <a:rPr lang="en-US"/>
+          <a:bodyPr>
+            <a:normAutofit/>
+          </a:bodyPr>
+          <a:lstStyle/>
+          <a:p>
+            <a:r>
+              <a:rPr lang="en-US" sz="2000" dirty="0">
+                <a:latin typeface="Candara" panose="020E0502030303020204" pitchFamily="34" charset="0"/>
+              </a:rPr>
               <a:t>Cũng như các mẫu Khởi tạo khác, mẫu Prototype nâng cao khả năng đóng gói của chương trình, client không hề biết chi tiết cách thức đối tượng được tạo ra một cách chi tiết.</a:t>
             </a:r>
           </a:p>
           <a:p>
-            <a:endParaRPr lang="en-US"/>
+            <a:endParaRPr lang="en-US" sz="2000" dirty="0">
+              <a:latin typeface="Candara" panose="020E0502030303020204" pitchFamily="34" charset="0"/>
+            </a:endParaRPr>
           </a:p>
         </p:txBody>
       </p:sp>
@@ -6900,7 +7200,7 @@
           <a:lstStyle/>
           <a:p>
             <a:r>
-              <a:rPr lang="en-US" b="1"/>
+              <a:rPr lang="en-US" b="1" dirty="0"/>
               <a:t>Các chú ý liên quan đến cài đặt</a:t>
             </a:r>
           </a:p>
@@ -6918,16 +7218,22 @@
         </p:nvSpPr>
         <p:spPr/>
         <p:txBody>
-          <a:bodyPr/>
-          <a:lstStyle/>
-          <a:p>
-            <a:r>
-              <a:rPr lang="en-US"/>
+          <a:bodyPr>
+            <a:normAutofit/>
+          </a:bodyPr>
+          <a:lstStyle/>
+          <a:p>
+            <a:r>
+              <a:rPr lang="en-US" sz="2000" dirty="0">
+                <a:latin typeface="Candara" panose="020E0502030303020204" pitchFamily="34" charset="0"/>
+              </a:rPr>
               <a:t>Trong C#, việc sao chép một đối tượng có thể diễn ra theo 2 cách: shallow copy và deep copy. Cần chú ý đến vấn đề này để có không gặp trục trặc trong quá trình sao chép một đối tượng.</a:t>
             </a:r>
           </a:p>
           <a:p>
-            <a:endParaRPr lang="en-US"/>
+            <a:endParaRPr lang="en-US" sz="2000" dirty="0">
+              <a:latin typeface="Candara" panose="020E0502030303020204" pitchFamily="34" charset="0"/>
+            </a:endParaRPr>
           </a:p>
         </p:txBody>
       </p:sp>

</xml_diff>